<commit_message>
MWW: wordsmithing and addressing some comments.  Related work will have to wait until tomorrow.
</commit_message>
<xml_diff>
--- a/engines.pptx
+++ b/engines.pptx
@@ -105,6 +105,22 @@
       </a:defRPr>
     </a:lvl9pPr>
   </p:defaultTextStyle>
+  <p:extLst>
+    <p:ext uri="{EFAFB233-063F-42B5-8137-9DF3F51BA10A}">
+      <p15:sldGuideLst xmlns:p15="http://schemas.microsoft.com/office/powerpoint/2012/main">
+        <p15:guide id="1" orient="horz" pos="2160">
+          <p15:clr>
+            <a:srgbClr val="A4A3A4"/>
+          </p15:clr>
+        </p15:guide>
+        <p15:guide id="2" pos="2880">
+          <p15:clr>
+            <a:srgbClr val="A4A3A4"/>
+          </p15:clr>
+        </p15:guide>
+      </p15:sldGuideLst>
+    </p:ext>
+  </p:extLst>
 </p:presentation>
 </file>
 
@@ -289,7 +305,7 @@
           <a:p>
             <a:fld id="{D46B5356-B54E-40AE-8E46-262CEBEB9AE2}" type="datetimeFigureOut">
               <a:rPr lang="en-US" smtClean="0"/>
-              <a:t>11/27/2017</a:t>
+              <a:t>1/29/2018</a:t>
             </a:fld>
             <a:endParaRPr lang="en-US"/>
           </a:p>
@@ -459,7 +475,7 @@
           <a:p>
             <a:fld id="{D46B5356-B54E-40AE-8E46-262CEBEB9AE2}" type="datetimeFigureOut">
               <a:rPr lang="en-US" smtClean="0"/>
-              <a:t>11/27/2017</a:t>
+              <a:t>1/29/2018</a:t>
             </a:fld>
             <a:endParaRPr lang="en-US"/>
           </a:p>
@@ -639,7 +655,7 @@
           <a:p>
             <a:fld id="{D46B5356-B54E-40AE-8E46-262CEBEB9AE2}" type="datetimeFigureOut">
               <a:rPr lang="en-US" smtClean="0"/>
-              <a:t>11/27/2017</a:t>
+              <a:t>1/29/2018</a:t>
             </a:fld>
             <a:endParaRPr lang="en-US"/>
           </a:p>
@@ -809,7 +825,7 @@
           <a:p>
             <a:fld id="{D46B5356-B54E-40AE-8E46-262CEBEB9AE2}" type="datetimeFigureOut">
               <a:rPr lang="en-US" smtClean="0"/>
-              <a:t>11/27/2017</a:t>
+              <a:t>1/29/2018</a:t>
             </a:fld>
             <a:endParaRPr lang="en-US"/>
           </a:p>
@@ -1055,7 +1071,7 @@
           <a:p>
             <a:fld id="{D46B5356-B54E-40AE-8E46-262CEBEB9AE2}" type="datetimeFigureOut">
               <a:rPr lang="en-US" smtClean="0"/>
-              <a:t>11/27/2017</a:t>
+              <a:t>1/29/2018</a:t>
             </a:fld>
             <a:endParaRPr lang="en-US"/>
           </a:p>
@@ -1343,7 +1359,7 @@
           <a:p>
             <a:fld id="{D46B5356-B54E-40AE-8E46-262CEBEB9AE2}" type="datetimeFigureOut">
               <a:rPr lang="en-US" smtClean="0"/>
-              <a:t>11/27/2017</a:t>
+              <a:t>1/29/2018</a:t>
             </a:fld>
             <a:endParaRPr lang="en-US"/>
           </a:p>
@@ -1765,7 +1781,7 @@
           <a:p>
             <a:fld id="{D46B5356-B54E-40AE-8E46-262CEBEB9AE2}" type="datetimeFigureOut">
               <a:rPr lang="en-US" smtClean="0"/>
-              <a:t>11/27/2017</a:t>
+              <a:t>1/29/2018</a:t>
             </a:fld>
             <a:endParaRPr lang="en-US"/>
           </a:p>
@@ -1883,7 +1899,7 @@
           <a:p>
             <a:fld id="{D46B5356-B54E-40AE-8E46-262CEBEB9AE2}" type="datetimeFigureOut">
               <a:rPr lang="en-US" smtClean="0"/>
-              <a:t>11/27/2017</a:t>
+              <a:t>1/29/2018</a:t>
             </a:fld>
             <a:endParaRPr lang="en-US"/>
           </a:p>
@@ -1978,7 +1994,7 @@
           <a:p>
             <a:fld id="{D46B5356-B54E-40AE-8E46-262CEBEB9AE2}" type="datetimeFigureOut">
               <a:rPr lang="en-US" smtClean="0"/>
-              <a:t>11/27/2017</a:t>
+              <a:t>1/29/2018</a:t>
             </a:fld>
             <a:endParaRPr lang="en-US"/>
           </a:p>
@@ -2255,7 +2271,7 @@
           <a:p>
             <a:fld id="{D46B5356-B54E-40AE-8E46-262CEBEB9AE2}" type="datetimeFigureOut">
               <a:rPr lang="en-US" smtClean="0"/>
-              <a:t>11/27/2017</a:t>
+              <a:t>1/29/2018</a:t>
             </a:fld>
             <a:endParaRPr lang="en-US"/>
           </a:p>
@@ -2508,7 +2524,7 @@
           <a:p>
             <a:fld id="{D46B5356-B54E-40AE-8E46-262CEBEB9AE2}" type="datetimeFigureOut">
               <a:rPr lang="en-US" smtClean="0"/>
-              <a:t>11/27/2017</a:t>
+              <a:t>1/29/2018</a:t>
             </a:fld>
             <a:endParaRPr lang="en-US"/>
           </a:p>
@@ -2721,7 +2737,7 @@
           <a:p>
             <a:fld id="{D46B5356-B54E-40AE-8E46-262CEBEB9AE2}" type="datetimeFigureOut">
               <a:rPr lang="en-US" smtClean="0"/>
-              <a:t>11/27/2017</a:t>
+              <a:t>1/29/2018</a:t>
             </a:fld>
             <a:endParaRPr lang="en-US"/>
           </a:p>
@@ -3105,7 +3121,7 @@
         <p:spPr>
           <a:xfrm>
             <a:off x="6629400" y="3429000"/>
-            <a:ext cx="3875" cy="762000"/>
+            <a:ext cx="0" cy="507087"/>
           </a:xfrm>
           <a:prstGeom prst="straightConnector1">
             <a:avLst/>
@@ -3450,7 +3466,7 @@
         </p:nvSpPr>
         <p:spPr>
           <a:xfrm>
-            <a:off x="2895600" y="1828800"/>
+            <a:off x="2895600" y="2246745"/>
             <a:ext cx="1066800" cy="420255"/>
           </a:xfrm>
           <a:prstGeom prst="rect">
@@ -3512,7 +3528,7 @@
         </p:nvSpPr>
         <p:spPr>
           <a:xfrm>
-            <a:off x="5029200" y="1818468"/>
+            <a:off x="5029200" y="2236413"/>
             <a:ext cx="1066800" cy="420255"/>
           </a:xfrm>
           <a:prstGeom prst="rect">
@@ -3595,7 +3611,8 @@
             <a:solidFill>
               <a:schemeClr val="tx1"/>
             </a:solidFill>
-            <a:tailEnd type="arrow"/>
+            <a:headEnd type="none" w="med" len="med"/>
+            <a:tailEnd type="triangle" w="med" len="med"/>
           </a:ln>
         </p:spPr>
         <p:style>
@@ -3654,8 +3671,8 @@
         </p:nvCxnSpPr>
         <p:spPr>
           <a:xfrm>
-            <a:off x="3429000" y="2249055"/>
-            <a:ext cx="1066800" cy="762900"/>
+            <a:off x="3429000" y="2667000"/>
+            <a:ext cx="1066800" cy="344955"/>
           </a:xfrm>
           <a:prstGeom prst="straightConnector1">
             <a:avLst/>
@@ -3664,7 +3681,8 @@
             <a:solidFill>
               <a:schemeClr val="tx1"/>
             </a:solidFill>
-            <a:tailEnd type="arrow"/>
+            <a:headEnd type="none" w="med" len="med"/>
+            <a:tailEnd type="triangle" w="med" len="med"/>
           </a:ln>
         </p:spPr>
         <p:style>
@@ -3693,8 +3711,147 @@
         </p:nvCxnSpPr>
         <p:spPr>
           <a:xfrm flipH="1">
-            <a:off x="4495800" y="2238723"/>
-            <a:ext cx="1066800" cy="773232"/>
+            <a:off x="4495800" y="2656668"/>
+            <a:ext cx="1066800" cy="355287"/>
+          </a:xfrm>
+          <a:prstGeom prst="straightConnector1">
+            <a:avLst/>
+          </a:prstGeom>
+          <a:ln w="12700">
+            <a:solidFill>
+              <a:schemeClr val="tx1"/>
+            </a:solidFill>
+            <a:headEnd type="none" w="med" len="med"/>
+            <a:tailEnd type="triangle" w="med" len="med"/>
+          </a:ln>
+        </p:spPr>
+        <p:style>
+          <a:lnRef idx="1">
+            <a:schemeClr val="accent1"/>
+          </a:lnRef>
+          <a:fillRef idx="0">
+            <a:schemeClr val="accent1"/>
+          </a:fillRef>
+          <a:effectRef idx="0">
+            <a:schemeClr val="accent1"/>
+          </a:effectRef>
+          <a:fontRef idx="minor">
+            <a:schemeClr val="tx1"/>
+          </a:fontRef>
+        </p:style>
+      </p:cxnSp>
+      <p:sp>
+        <p:nvSpPr>
+          <p:cNvPr id="20" name="TextBox 19"/>
+          <p:cNvSpPr txBox="1"/>
+          <p:nvPr/>
+        </p:nvSpPr>
+        <p:spPr>
+          <a:xfrm>
+            <a:off x="4100403" y="2667000"/>
+            <a:ext cx="745717" cy="261610"/>
+          </a:xfrm>
+          <a:prstGeom prst="rect">
+            <a:avLst/>
+          </a:prstGeom>
+          <a:noFill/>
+        </p:spPr>
+        <p:txBody>
+          <a:bodyPr wrap="none" rtlCol="0">
+            <a:spAutoFit/>
+          </a:bodyPr>
+          <a:lstStyle/>
+          <a:p>
+            <a:r>
+              <a:rPr lang="en-US" sz="1050" dirty="0" smtClean="0"/>
+              <a:t>invariants</a:t>
+            </a:r>
+            <a:endParaRPr lang="en-US" sz="1050" dirty="0"/>
+          </a:p>
+        </p:txBody>
+      </p:sp>
+      <p:cxnSp>
+        <p:nvCxnSpPr>
+          <p:cNvPr id="21" name="Straight Arrow Connector 20"/>
+          <p:cNvCxnSpPr>
+            <a:stCxn id="5" idx="3"/>
+            <a:endCxn id="4" idx="1"/>
+          </p:cNvCxnSpPr>
+          <p:nvPr/>
+        </p:nvCxnSpPr>
+        <p:spPr>
+          <a:xfrm>
+            <a:off x="2895600" y="3222083"/>
+            <a:ext cx="1066800" cy="0"/>
+          </a:xfrm>
+          <a:prstGeom prst="straightConnector1">
+            <a:avLst/>
+          </a:prstGeom>
+          <a:ln w="12700">
+            <a:solidFill>
+              <a:schemeClr val="tx1"/>
+            </a:solidFill>
+            <a:headEnd type="none" w="med" len="med"/>
+            <a:tailEnd type="triangle" w="med" len="med"/>
+          </a:ln>
+        </p:spPr>
+        <p:style>
+          <a:lnRef idx="1">
+            <a:schemeClr val="accent1"/>
+          </a:lnRef>
+          <a:fillRef idx="0">
+            <a:schemeClr val="accent1"/>
+          </a:fillRef>
+          <a:effectRef idx="0">
+            <a:schemeClr val="accent1"/>
+          </a:effectRef>
+          <a:fontRef idx="minor">
+            <a:schemeClr val="tx1"/>
+          </a:fontRef>
+        </p:style>
+      </p:cxnSp>
+      <p:sp>
+        <p:nvSpPr>
+          <p:cNvPr id="24" name="TextBox 23"/>
+          <p:cNvSpPr txBox="1"/>
+          <p:nvPr/>
+        </p:nvSpPr>
+        <p:spPr>
+          <a:xfrm>
+            <a:off x="3033603" y="2999601"/>
+            <a:ext cx="728084" cy="261610"/>
+          </a:xfrm>
+          <a:prstGeom prst="rect">
+            <a:avLst/>
+          </a:prstGeom>
+          <a:noFill/>
+        </p:spPr>
+        <p:txBody>
+          <a:bodyPr wrap="none" rtlCol="0">
+            <a:spAutoFit/>
+          </a:bodyPr>
+          <a:lstStyle/>
+          <a:p>
+            <a:r>
+              <a:rPr lang="en-US" sz="1050" dirty="0" smtClean="0"/>
+              <a:t>base step</a:t>
+            </a:r>
+            <a:endParaRPr lang="en-US" sz="1050" dirty="0"/>
+          </a:p>
+        </p:txBody>
+      </p:sp>
+      <p:cxnSp>
+        <p:nvCxnSpPr>
+          <p:cNvPr id="25" name="Straight Arrow Connector 24"/>
+          <p:cNvCxnSpPr>
+            <a:stCxn id="5" idx="2"/>
+          </p:cNvCxnSpPr>
+          <p:nvPr/>
+        </p:nvCxnSpPr>
+        <p:spPr>
+          <a:xfrm>
+            <a:off x="2362200" y="3432210"/>
+            <a:ext cx="0" cy="503877"/>
           </a:xfrm>
           <a:prstGeom prst="straightConnector1">
             <a:avLst/>
@@ -3723,14 +3880,14 @@
       </p:cxnSp>
       <p:sp>
         <p:nvSpPr>
-          <p:cNvPr id="20" name="TextBox 19"/>
+          <p:cNvPr id="28" name="TextBox 27"/>
           <p:cNvSpPr txBox="1"/>
           <p:nvPr/>
         </p:nvSpPr>
         <p:spPr>
           <a:xfrm>
-            <a:off x="4100403" y="2492846"/>
-            <a:ext cx="745717" cy="261610"/>
+            <a:off x="2347993" y="3505200"/>
+            <a:ext cx="779381" cy="430887"/>
           </a:xfrm>
           <a:prstGeom prst="rect">
             <a:avLst/>
@@ -3744,8 +3901,18 @@
           <a:lstStyle/>
           <a:p>
             <a:r>
+              <a:rPr lang="en-US" sz="1050" dirty="0"/>
+              <a:t>i</a:t>
+            </a:r>
+            <a:r>
               <a:rPr lang="en-US" sz="1050" dirty="0" smtClean="0"/>
-              <a:t>invariants</a:t>
+              <a:t>nvalid</a:t>
+            </a:r>
+          </a:p>
+          <a:p>
+            <a:r>
+              <a:rPr lang="en-US" sz="1050" dirty="0" smtClean="0"/>
+              <a:t>properties</a:t>
             </a:r>
             <a:endParaRPr lang="en-US" sz="1050" dirty="0"/>
           </a:p>
@@ -3753,17 +3920,16 @@
       </p:sp>
       <p:cxnSp>
         <p:nvCxnSpPr>
-          <p:cNvPr id="21" name="Straight Arrow Connector 20"/>
+          <p:cNvPr id="30" name="Straight Arrow Connector 29"/>
           <p:cNvCxnSpPr>
-            <a:stCxn id="5" idx="3"/>
-            <a:endCxn id="4" idx="1"/>
+            <a:stCxn id="4" idx="2"/>
           </p:cNvCxnSpPr>
           <p:nvPr/>
         </p:nvCxnSpPr>
         <p:spPr>
           <a:xfrm>
-            <a:off x="2895600" y="3222083"/>
-            <a:ext cx="1066800" cy="0"/>
+            <a:off x="4495800" y="3432210"/>
+            <a:ext cx="0" cy="503877"/>
           </a:xfrm>
           <a:prstGeom prst="straightConnector1">
             <a:avLst/>
@@ -3792,14 +3958,14 @@
       </p:cxnSp>
       <p:sp>
         <p:nvSpPr>
-          <p:cNvPr id="24" name="TextBox 23"/>
+          <p:cNvPr id="32" name="TextBox 31"/>
           <p:cNvSpPr txBox="1"/>
           <p:nvPr/>
         </p:nvSpPr>
         <p:spPr>
           <a:xfrm>
-            <a:off x="3033603" y="2999601"/>
-            <a:ext cx="728084" cy="261610"/>
+            <a:off x="4495800" y="3505200"/>
+            <a:ext cx="779381" cy="430887"/>
           </a:xfrm>
           <a:prstGeom prst="rect">
             <a:avLst/>
@@ -3813,8 +3979,54 @@
           <a:lstStyle/>
           <a:p>
             <a:r>
+              <a:rPr lang="en-US" sz="1050" dirty="0"/>
+              <a:t>v</a:t>
+            </a:r>
+            <a:r>
               <a:rPr lang="en-US" sz="1050" dirty="0" smtClean="0"/>
-              <a:t>base step</a:t>
+              <a:t>alid</a:t>
+            </a:r>
+          </a:p>
+          <a:p>
+            <a:r>
+              <a:rPr lang="en-US" sz="1050" dirty="0" smtClean="0"/>
+              <a:t>properties</a:t>
+            </a:r>
+            <a:endParaRPr lang="en-US" sz="1050" dirty="0"/>
+          </a:p>
+        </p:txBody>
+      </p:sp>
+      <p:sp>
+        <p:nvSpPr>
+          <p:cNvPr id="34" name="TextBox 33"/>
+          <p:cNvSpPr txBox="1"/>
+          <p:nvPr/>
+        </p:nvSpPr>
+        <p:spPr>
+          <a:xfrm>
+            <a:off x="6629400" y="3653135"/>
+            <a:ext cx="950901" cy="415498"/>
+          </a:xfrm>
+          <a:prstGeom prst="rect">
+            <a:avLst/>
+          </a:prstGeom>
+          <a:noFill/>
+        </p:spPr>
+        <p:txBody>
+          <a:bodyPr wrap="none" rtlCol="0">
+            <a:spAutoFit/>
+          </a:bodyPr>
+          <a:lstStyle/>
+          <a:p>
+            <a:r>
+              <a:rPr lang="en-US" sz="1050" dirty="0" smtClean="0"/>
+              <a:t>valid &amp; invalid</a:t>
+            </a:r>
+          </a:p>
+          <a:p>
+            <a:r>
+              <a:rPr lang="en-US" sz="1050" dirty="0" smtClean="0"/>
+              <a:t>properties</a:t>
             </a:r>
             <a:endParaRPr lang="en-US" sz="1050" dirty="0"/>
           </a:p>
@@ -3822,16 +4034,16 @@
       </p:sp>
       <p:cxnSp>
         <p:nvCxnSpPr>
-          <p:cNvPr id="25" name="Straight Arrow Connector 24"/>
+          <p:cNvPr id="40" name="Straight Arrow Connector 39"/>
           <p:cNvCxnSpPr>
-            <a:stCxn id="5" idx="2"/>
+            <a:stCxn id="9" idx="0"/>
           </p:cNvCxnSpPr>
           <p:nvPr/>
         </p:nvCxnSpPr>
         <p:spPr>
-          <a:xfrm>
-            <a:off x="2362200" y="3432210"/>
-            <a:ext cx="0" cy="758790"/>
+          <a:xfrm flipV="1">
+            <a:off x="3429000" y="1785080"/>
+            <a:ext cx="0" cy="461665"/>
           </a:xfrm>
           <a:prstGeom prst="straightConnector1">
             <a:avLst/>
@@ -3860,14 +4072,14 @@
       </p:cxnSp>
       <p:sp>
         <p:nvSpPr>
-          <p:cNvPr id="28" name="TextBox 27"/>
+          <p:cNvPr id="47" name="TextBox 46"/>
           <p:cNvSpPr txBox="1"/>
           <p:nvPr/>
         </p:nvSpPr>
         <p:spPr>
           <a:xfrm>
-            <a:off x="2347993" y="3505200"/>
-            <a:ext cx="779381" cy="430887"/>
+            <a:off x="3505200" y="1785080"/>
+            <a:ext cx="790601" cy="415498"/>
           </a:xfrm>
           <a:prstGeom prst="rect">
             <a:avLst/>
@@ -3882,11 +4094,51 @@
           <a:p>
             <a:r>
               <a:rPr lang="en-US" sz="1050" dirty="0"/>
-              <a:t>i</a:t>
+              <a:t>v</a:t>
             </a:r>
             <a:r>
               <a:rPr lang="en-US" sz="1050" dirty="0" smtClean="0"/>
-              <a:t>nvalid</a:t>
+              <a:t>alid</a:t>
+            </a:r>
+          </a:p>
+          <a:p>
+            <a:r>
+              <a:rPr lang="en-US" sz="1050" dirty="0" smtClean="0"/>
+              <a:t>Properties`</a:t>
+            </a:r>
+            <a:endParaRPr lang="en-US" sz="1050" dirty="0"/>
+          </a:p>
+        </p:txBody>
+      </p:sp>
+      <p:sp>
+        <p:nvSpPr>
+          <p:cNvPr id="48" name="TextBox 47"/>
+          <p:cNvSpPr txBox="1"/>
+          <p:nvPr/>
+        </p:nvSpPr>
+        <p:spPr>
+          <a:xfrm>
+            <a:off x="5581612" y="1785080"/>
+            <a:ext cx="779381" cy="430887"/>
+          </a:xfrm>
+          <a:prstGeom prst="rect">
+            <a:avLst/>
+          </a:prstGeom>
+          <a:noFill/>
+        </p:spPr>
+        <p:txBody>
+          <a:bodyPr wrap="none" rtlCol="0">
+            <a:spAutoFit/>
+          </a:bodyPr>
+          <a:lstStyle/>
+          <a:p>
+            <a:r>
+              <a:rPr lang="en-US" sz="1050" dirty="0"/>
+              <a:t>v</a:t>
+            </a:r>
+            <a:r>
+              <a:rPr lang="en-US" sz="1050" dirty="0" smtClean="0"/>
+              <a:t>alid</a:t>
             </a:r>
           </a:p>
           <a:p>
@@ -3900,16 +4152,16 @@
       </p:sp>
       <p:cxnSp>
         <p:nvCxnSpPr>
-          <p:cNvPr id="30" name="Straight Arrow Connector 29"/>
+          <p:cNvPr id="27" name="Straight Arrow Connector 26"/>
           <p:cNvCxnSpPr>
-            <a:stCxn id="4" idx="2"/>
+            <a:stCxn id="10" idx="0"/>
           </p:cNvCxnSpPr>
           <p:nvPr/>
         </p:nvCxnSpPr>
         <p:spPr>
-          <a:xfrm>
-            <a:off x="4495800" y="3432210"/>
-            <a:ext cx="0" cy="758790"/>
+          <a:xfrm flipV="1">
+            <a:off x="5562600" y="1785081"/>
+            <a:ext cx="0" cy="451332"/>
           </a:xfrm>
           <a:prstGeom prst="straightConnector1">
             <a:avLst/>
@@ -3936,238 +4188,6 @@
           </a:fontRef>
         </p:style>
       </p:cxnSp>
-      <p:sp>
-        <p:nvSpPr>
-          <p:cNvPr id="32" name="TextBox 31"/>
-          <p:cNvSpPr txBox="1"/>
-          <p:nvPr/>
-        </p:nvSpPr>
-        <p:spPr>
-          <a:xfrm>
-            <a:off x="4495800" y="3505200"/>
-            <a:ext cx="779381" cy="430887"/>
-          </a:xfrm>
-          <a:prstGeom prst="rect">
-            <a:avLst/>
-          </a:prstGeom>
-          <a:noFill/>
-        </p:spPr>
-        <p:txBody>
-          <a:bodyPr wrap="none" rtlCol="0">
-            <a:spAutoFit/>
-          </a:bodyPr>
-          <a:lstStyle/>
-          <a:p>
-            <a:r>
-              <a:rPr lang="en-US" sz="1050" dirty="0"/>
-              <a:t>v</a:t>
-            </a:r>
-            <a:r>
-              <a:rPr lang="en-US" sz="1050" dirty="0" smtClean="0"/>
-              <a:t>alid</a:t>
-            </a:r>
-          </a:p>
-          <a:p>
-            <a:r>
-              <a:rPr lang="en-US" sz="1050" dirty="0" smtClean="0"/>
-              <a:t>properties</a:t>
-            </a:r>
-            <a:endParaRPr lang="en-US" sz="1050" dirty="0"/>
-          </a:p>
-        </p:txBody>
-      </p:sp>
-      <p:sp>
-        <p:nvSpPr>
-          <p:cNvPr id="34" name="TextBox 33"/>
-          <p:cNvSpPr txBox="1"/>
-          <p:nvPr/>
-        </p:nvSpPr>
-        <p:spPr>
-          <a:xfrm>
-            <a:off x="6630459" y="3653135"/>
-            <a:ext cx="950901" cy="415498"/>
-          </a:xfrm>
-          <a:prstGeom prst="rect">
-            <a:avLst/>
-          </a:prstGeom>
-          <a:noFill/>
-        </p:spPr>
-        <p:txBody>
-          <a:bodyPr wrap="none" rtlCol="0">
-            <a:spAutoFit/>
-          </a:bodyPr>
-          <a:lstStyle/>
-          <a:p>
-            <a:r>
-              <a:rPr lang="en-US" sz="1050" dirty="0" smtClean="0"/>
-              <a:t>valid &amp; invalid</a:t>
-            </a:r>
-          </a:p>
-          <a:p>
-            <a:r>
-              <a:rPr lang="en-US" sz="1050" dirty="0" smtClean="0"/>
-              <a:t>properties</a:t>
-            </a:r>
-            <a:endParaRPr lang="en-US" sz="1050" dirty="0"/>
-          </a:p>
-        </p:txBody>
-      </p:sp>
-      <p:cxnSp>
-        <p:nvCxnSpPr>
-          <p:cNvPr id="40" name="Straight Arrow Connector 39"/>
-          <p:cNvCxnSpPr>
-            <a:stCxn id="9" idx="0"/>
-          </p:cNvCxnSpPr>
-          <p:nvPr/>
-        </p:nvCxnSpPr>
-        <p:spPr>
-          <a:xfrm flipH="1" flipV="1">
-            <a:off x="3423998" y="1219200"/>
-            <a:ext cx="5002" cy="609600"/>
-          </a:xfrm>
-          <a:prstGeom prst="straightConnector1">
-            <a:avLst/>
-          </a:prstGeom>
-          <a:ln w="12700">
-            <a:solidFill>
-              <a:schemeClr val="tx1"/>
-            </a:solidFill>
-            <a:tailEnd type="arrow"/>
-          </a:ln>
-        </p:spPr>
-        <p:style>
-          <a:lnRef idx="1">
-            <a:schemeClr val="accent1"/>
-          </a:lnRef>
-          <a:fillRef idx="0">
-            <a:schemeClr val="accent1"/>
-          </a:fillRef>
-          <a:effectRef idx="0">
-            <a:schemeClr val="accent1"/>
-          </a:effectRef>
-          <a:fontRef idx="minor">
-            <a:schemeClr val="tx1"/>
-          </a:fontRef>
-        </p:style>
-      </p:cxnSp>
-      <p:cxnSp>
-        <p:nvCxnSpPr>
-          <p:cNvPr id="43" name="Straight Arrow Connector 42"/>
-          <p:cNvCxnSpPr>
-            <a:stCxn id="10" idx="0"/>
-          </p:cNvCxnSpPr>
-          <p:nvPr/>
-        </p:nvCxnSpPr>
-        <p:spPr>
-          <a:xfrm flipV="1">
-            <a:off x="5562600" y="1219200"/>
-            <a:ext cx="0" cy="599268"/>
-          </a:xfrm>
-          <a:prstGeom prst="straightConnector1">
-            <a:avLst/>
-          </a:prstGeom>
-          <a:ln w="12700">
-            <a:solidFill>
-              <a:schemeClr val="tx1"/>
-            </a:solidFill>
-            <a:tailEnd type="arrow"/>
-          </a:ln>
-        </p:spPr>
-        <p:style>
-          <a:lnRef idx="1">
-            <a:schemeClr val="accent1"/>
-          </a:lnRef>
-          <a:fillRef idx="0">
-            <a:schemeClr val="accent1"/>
-          </a:fillRef>
-          <a:effectRef idx="0">
-            <a:schemeClr val="accent1"/>
-          </a:effectRef>
-          <a:fontRef idx="minor">
-            <a:schemeClr val="tx1"/>
-          </a:fontRef>
-        </p:style>
-      </p:cxnSp>
-      <p:sp>
-        <p:nvSpPr>
-          <p:cNvPr id="47" name="TextBox 46"/>
-          <p:cNvSpPr txBox="1"/>
-          <p:nvPr/>
-        </p:nvSpPr>
-        <p:spPr>
-          <a:xfrm>
-            <a:off x="3423998" y="1367135"/>
-            <a:ext cx="779381" cy="430887"/>
-          </a:xfrm>
-          <a:prstGeom prst="rect">
-            <a:avLst/>
-          </a:prstGeom>
-          <a:noFill/>
-        </p:spPr>
-        <p:txBody>
-          <a:bodyPr wrap="none" rtlCol="0">
-            <a:spAutoFit/>
-          </a:bodyPr>
-          <a:lstStyle/>
-          <a:p>
-            <a:r>
-              <a:rPr lang="en-US" sz="1050" dirty="0"/>
-              <a:t>v</a:t>
-            </a:r>
-            <a:r>
-              <a:rPr lang="en-US" sz="1050" dirty="0" smtClean="0"/>
-              <a:t>alid</a:t>
-            </a:r>
-          </a:p>
-          <a:p>
-            <a:r>
-              <a:rPr lang="en-US" sz="1050" dirty="0" smtClean="0"/>
-              <a:t>properties</a:t>
-            </a:r>
-            <a:endParaRPr lang="en-US" sz="1050" dirty="0"/>
-          </a:p>
-        </p:txBody>
-      </p:sp>
-      <p:sp>
-        <p:nvSpPr>
-          <p:cNvPr id="48" name="TextBox 47"/>
-          <p:cNvSpPr txBox="1"/>
-          <p:nvPr/>
-        </p:nvSpPr>
-        <p:spPr>
-          <a:xfrm>
-            <a:off x="5581612" y="1367135"/>
-            <a:ext cx="779381" cy="430887"/>
-          </a:xfrm>
-          <a:prstGeom prst="rect">
-            <a:avLst/>
-          </a:prstGeom>
-          <a:noFill/>
-        </p:spPr>
-        <p:txBody>
-          <a:bodyPr wrap="none" rtlCol="0">
-            <a:spAutoFit/>
-          </a:bodyPr>
-          <a:lstStyle/>
-          <a:p>
-            <a:r>
-              <a:rPr lang="en-US" sz="1050" dirty="0"/>
-              <a:t>v</a:t>
-            </a:r>
-            <a:r>
-              <a:rPr lang="en-US" sz="1050" dirty="0" smtClean="0"/>
-              <a:t>alid</a:t>
-            </a:r>
-          </a:p>
-          <a:p>
-            <a:r>
-              <a:rPr lang="en-US" sz="1050" dirty="0" smtClean="0"/>
-              <a:t>properties</a:t>
-            </a:r>
-            <a:endParaRPr lang="en-US" sz="1050" dirty="0"/>
-          </a:p>
-        </p:txBody>
-      </p:sp>
     </p:spTree>
     <p:extLst>
       <p:ext uri="{BB962C8B-B14F-4D97-AF65-F5344CB8AC3E}">

</xml_diff>